<commit_message>
Included png for m3_overview
</commit_message>
<xml_diff>
--- a/images/mapmaker/m3_overview.pptx
+++ b/images/mapmaker/m3_overview.pptx
@@ -2,12 +2,12 @@
 <file path=ppt/presentation.xml><?xml version="1.0" encoding="utf-8"?>
 <p:presentation xmlns:a="http://schemas.openxmlformats.org/drawingml/2006/main" xmlns:r="http://schemas.openxmlformats.org/officeDocument/2006/relationships" xmlns:p="http://schemas.openxmlformats.org/presentationml/2006/main" saveSubsetFonts="1">
   <p:sldMasterIdLst>
-    <p:sldMasterId id="2147483684" r:id="rId1"/>
+    <p:sldMasterId id="2147483708" r:id="rId1"/>
   </p:sldMasterIdLst>
   <p:sldIdLst>
     <p:sldId id="256" r:id="rId2"/>
   </p:sldIdLst>
-  <p:sldSz cx="7199313" cy="3600450"/>
+  <p:sldSz cx="7920038" cy="5400675"/>
   <p:notesSz cx="6858000" cy="9144000"/>
   <p:defaultTextStyle>
     <a:defPPr>
@@ -104,7 +104,16 @@
       </a:defRPr>
     </a:lvl9pPr>
   </p:defaultTextStyle>
+  <p:extLst>
+    <p:ext uri="{EFAFB233-063F-42B5-8137-9DF3F51BA10A}">
+      <p15:sldGuideLst xmlns:p15="http://schemas.microsoft.com/office/powerpoint/2012/main"/>
+    </p:ext>
+  </p:extLst>
 </p:presentation>
+</file>
+
+<file path=ppt/revisionInfo.xml><?xml version="1.0" encoding="utf-8"?>
+<p1510:revInfo xmlns:a="http://schemas.openxmlformats.org/drawingml/2006/main" xmlns:r="http://schemas.openxmlformats.org/officeDocument/2006/relationships" xmlns:p1510="http://schemas.microsoft.com/office/powerpoint/2015/10/main"/>
 </file>
 
 <file path=ppt/slideLayouts/slideLayout1.xml><?xml version="1.0" encoding="utf-8"?>
@@ -136,15 +145,15 @@
         </p:nvSpPr>
         <p:spPr>
           <a:xfrm>
-            <a:off x="899914" y="589241"/>
-            <a:ext cx="5399485" cy="1253490"/>
+            <a:off x="594003" y="883861"/>
+            <a:ext cx="6732032" cy="1880235"/>
           </a:xfrm>
         </p:spPr>
         <p:txBody>
           <a:bodyPr anchor="b"/>
           <a:lstStyle>
             <a:lvl1pPr algn="ctr">
-              <a:defRPr sz="3150"/>
+              <a:defRPr sz="4725"/>
             </a:lvl1pPr>
           </a:lstStyle>
           <a:p>
@@ -168,8 +177,8 @@
         </p:nvSpPr>
         <p:spPr>
           <a:xfrm>
-            <a:off x="899914" y="1891070"/>
-            <a:ext cx="5399485" cy="869275"/>
+            <a:off x="990005" y="2836605"/>
+            <a:ext cx="5940029" cy="1303913"/>
           </a:xfrm>
         </p:spPr>
         <p:txBody>
@@ -177,39 +186,39 @@
           <a:lstStyle>
             <a:lvl1pPr marL="0" indent="0" algn="ctr">
               <a:buNone/>
+              <a:defRPr sz="1890"/>
+            </a:lvl1pPr>
+            <a:lvl2pPr marL="360045" indent="0" algn="ctr">
+              <a:buNone/>
+              <a:defRPr sz="1575"/>
+            </a:lvl2pPr>
+            <a:lvl3pPr marL="720090" indent="0" algn="ctr">
+              <a:buNone/>
+              <a:defRPr sz="1418"/>
+            </a:lvl3pPr>
+            <a:lvl4pPr marL="1080135" indent="0" algn="ctr">
+              <a:buNone/>
               <a:defRPr sz="1260"/>
-            </a:lvl1pPr>
-            <a:lvl2pPr marL="240030" indent="0" algn="ctr">
-              <a:buNone/>
-              <a:defRPr sz="1050"/>
-            </a:lvl2pPr>
-            <a:lvl3pPr marL="480060" indent="0" algn="ctr">
-              <a:buNone/>
-              <a:defRPr sz="945"/>
-            </a:lvl3pPr>
-            <a:lvl4pPr marL="720090" indent="0" algn="ctr">
-              <a:buNone/>
-              <a:defRPr sz="840"/>
             </a:lvl4pPr>
-            <a:lvl5pPr marL="960120" indent="0" algn="ctr">
-              <a:buNone/>
-              <a:defRPr sz="840"/>
+            <a:lvl5pPr marL="1440180" indent="0" algn="ctr">
+              <a:buNone/>
+              <a:defRPr sz="1260"/>
             </a:lvl5pPr>
-            <a:lvl6pPr marL="1200150" indent="0" algn="ctr">
-              <a:buNone/>
-              <a:defRPr sz="840"/>
+            <a:lvl6pPr marL="1800225" indent="0" algn="ctr">
+              <a:buNone/>
+              <a:defRPr sz="1260"/>
             </a:lvl6pPr>
-            <a:lvl7pPr marL="1440180" indent="0" algn="ctr">
-              <a:buNone/>
-              <a:defRPr sz="840"/>
+            <a:lvl7pPr marL="2160270" indent="0" algn="ctr">
+              <a:buNone/>
+              <a:defRPr sz="1260"/>
             </a:lvl7pPr>
-            <a:lvl8pPr marL="1680210" indent="0" algn="ctr">
-              <a:buNone/>
-              <a:defRPr sz="840"/>
+            <a:lvl8pPr marL="2520315" indent="0" algn="ctr">
+              <a:buNone/>
+              <a:defRPr sz="1260"/>
             </a:lvl8pPr>
-            <a:lvl9pPr marL="1920240" indent="0" algn="ctr">
-              <a:buNone/>
-              <a:defRPr sz="840"/>
+            <a:lvl9pPr marL="2880360" indent="0" algn="ctr">
+              <a:buNone/>
+              <a:defRPr sz="1260"/>
             </a:lvl9pPr>
           </a:lstStyle>
           <a:p>
@@ -289,7 +298,7 @@
     </p:spTree>
     <p:extLst>
       <p:ext uri="{BB962C8B-B14F-4D97-AF65-F5344CB8AC3E}">
-        <p14:creationId xmlns:p14="http://schemas.microsoft.com/office/powerpoint/2010/main" val="2362539827"/>
+        <p14:creationId xmlns:p14="http://schemas.microsoft.com/office/powerpoint/2010/main" val="292303791"/>
       </p:ext>
     </p:extLst>
   </p:cSld>
@@ -459,7 +468,7 @@
     </p:spTree>
     <p:extLst>
       <p:ext uri="{BB962C8B-B14F-4D97-AF65-F5344CB8AC3E}">
-        <p14:creationId xmlns:p14="http://schemas.microsoft.com/office/powerpoint/2010/main" val="2884474797"/>
+        <p14:creationId xmlns:p14="http://schemas.microsoft.com/office/powerpoint/2010/main" val="3707166433"/>
       </p:ext>
     </p:extLst>
   </p:cSld>
@@ -498,8 +507,8 @@
         </p:nvSpPr>
         <p:spPr>
           <a:xfrm>
-            <a:off x="5152008" y="191691"/>
-            <a:ext cx="1552352" cy="3051215"/>
+            <a:off x="5667778" y="287536"/>
+            <a:ext cx="1707758" cy="4576822"/>
           </a:xfrm>
         </p:spPr>
         <p:txBody>
@@ -526,8 +535,8 @@
         </p:nvSpPr>
         <p:spPr>
           <a:xfrm>
-            <a:off x="494953" y="191691"/>
-            <a:ext cx="4567064" cy="3051215"/>
+            <a:off x="544503" y="287536"/>
+            <a:ext cx="5024274" cy="4576822"/>
           </a:xfrm>
         </p:spPr>
         <p:txBody>
@@ -639,7 +648,7 @@
     </p:spTree>
     <p:extLst>
       <p:ext uri="{BB962C8B-B14F-4D97-AF65-F5344CB8AC3E}">
-        <p14:creationId xmlns:p14="http://schemas.microsoft.com/office/powerpoint/2010/main" val="3877868849"/>
+        <p14:creationId xmlns:p14="http://schemas.microsoft.com/office/powerpoint/2010/main" val="3024298777"/>
       </p:ext>
     </p:extLst>
   </p:cSld>
@@ -809,7 +818,7 @@
     </p:spTree>
     <p:extLst>
       <p:ext uri="{BB962C8B-B14F-4D97-AF65-F5344CB8AC3E}">
-        <p14:creationId xmlns:p14="http://schemas.microsoft.com/office/powerpoint/2010/main" val="3868909521"/>
+        <p14:creationId xmlns:p14="http://schemas.microsoft.com/office/powerpoint/2010/main" val="1195547768"/>
       </p:ext>
     </p:extLst>
   </p:cSld>
@@ -848,15 +857,15 @@
         </p:nvSpPr>
         <p:spPr>
           <a:xfrm>
-            <a:off x="491203" y="897613"/>
-            <a:ext cx="6209407" cy="1497687"/>
+            <a:off x="540378" y="1346420"/>
+            <a:ext cx="6831033" cy="2246530"/>
           </a:xfrm>
         </p:spPr>
         <p:txBody>
           <a:bodyPr anchor="b"/>
           <a:lstStyle>
             <a:lvl1pPr>
-              <a:defRPr sz="3150"/>
+              <a:defRPr sz="4725"/>
             </a:lvl1pPr>
           </a:lstStyle>
           <a:p>
@@ -880,14 +889,42 @@
         </p:nvSpPr>
         <p:spPr>
           <a:xfrm>
-            <a:off x="491203" y="2409468"/>
-            <a:ext cx="6209407" cy="787598"/>
+            <a:off x="540378" y="3614203"/>
+            <a:ext cx="6831033" cy="1181397"/>
           </a:xfrm>
         </p:spPr>
         <p:txBody>
           <a:bodyPr/>
           <a:lstStyle>
             <a:lvl1pPr marL="0" indent="0">
+              <a:buNone/>
+              <a:defRPr sz="1890">
+                <a:solidFill>
+                  <a:schemeClr val="tx1"/>
+                </a:solidFill>
+              </a:defRPr>
+            </a:lvl1pPr>
+            <a:lvl2pPr marL="360045" indent="0">
+              <a:buNone/>
+              <a:defRPr sz="1575">
+                <a:solidFill>
+                  <a:schemeClr val="tx1">
+                    <a:tint val="75000"/>
+                  </a:schemeClr>
+                </a:solidFill>
+              </a:defRPr>
+            </a:lvl2pPr>
+            <a:lvl3pPr marL="720090" indent="0">
+              <a:buNone/>
+              <a:defRPr sz="1418">
+                <a:solidFill>
+                  <a:schemeClr val="tx1">
+                    <a:tint val="75000"/>
+                  </a:schemeClr>
+                </a:solidFill>
+              </a:defRPr>
+            </a:lvl3pPr>
+            <a:lvl4pPr marL="1080135" indent="0">
               <a:buNone/>
               <a:defRPr sz="1260">
                 <a:solidFill>
@@ -896,40 +933,10 @@
                   </a:schemeClr>
                 </a:solidFill>
               </a:defRPr>
-            </a:lvl1pPr>
-            <a:lvl2pPr marL="240030" indent="0">
-              <a:buNone/>
-              <a:defRPr sz="1050">
-                <a:solidFill>
-                  <a:schemeClr val="tx1">
-                    <a:tint val="75000"/>
-                  </a:schemeClr>
-                </a:solidFill>
-              </a:defRPr>
-            </a:lvl2pPr>
-            <a:lvl3pPr marL="480060" indent="0">
-              <a:buNone/>
-              <a:defRPr sz="945">
-                <a:solidFill>
-                  <a:schemeClr val="tx1">
-                    <a:tint val="75000"/>
-                  </a:schemeClr>
-                </a:solidFill>
-              </a:defRPr>
-            </a:lvl3pPr>
-            <a:lvl4pPr marL="720090" indent="0">
-              <a:buNone/>
-              <a:defRPr sz="840">
-                <a:solidFill>
-                  <a:schemeClr val="tx1">
-                    <a:tint val="75000"/>
-                  </a:schemeClr>
-                </a:solidFill>
-              </a:defRPr>
             </a:lvl4pPr>
-            <a:lvl5pPr marL="960120" indent="0">
-              <a:buNone/>
-              <a:defRPr sz="840">
+            <a:lvl5pPr marL="1440180" indent="0">
+              <a:buNone/>
+              <a:defRPr sz="1260">
                 <a:solidFill>
                   <a:schemeClr val="tx1">
                     <a:tint val="75000"/>
@@ -937,9 +944,9 @@
                 </a:solidFill>
               </a:defRPr>
             </a:lvl5pPr>
-            <a:lvl6pPr marL="1200150" indent="0">
-              <a:buNone/>
-              <a:defRPr sz="840">
+            <a:lvl6pPr marL="1800225" indent="0">
+              <a:buNone/>
+              <a:defRPr sz="1260">
                 <a:solidFill>
                   <a:schemeClr val="tx1">
                     <a:tint val="75000"/>
@@ -947,9 +954,9 @@
                 </a:solidFill>
               </a:defRPr>
             </a:lvl6pPr>
-            <a:lvl7pPr marL="1440180" indent="0">
-              <a:buNone/>
-              <a:defRPr sz="840">
+            <a:lvl7pPr marL="2160270" indent="0">
+              <a:buNone/>
+              <a:defRPr sz="1260">
                 <a:solidFill>
                   <a:schemeClr val="tx1">
                     <a:tint val="75000"/>
@@ -957,9 +964,9 @@
                 </a:solidFill>
               </a:defRPr>
             </a:lvl7pPr>
-            <a:lvl8pPr marL="1680210" indent="0">
-              <a:buNone/>
-              <a:defRPr sz="840">
+            <a:lvl8pPr marL="2520315" indent="0">
+              <a:buNone/>
+              <a:defRPr sz="1260">
                 <a:solidFill>
                   <a:schemeClr val="tx1">
                     <a:tint val="75000"/>
@@ -967,9 +974,9 @@
                 </a:solidFill>
               </a:defRPr>
             </a:lvl8pPr>
-            <a:lvl9pPr marL="1920240" indent="0">
-              <a:buNone/>
-              <a:defRPr sz="840">
+            <a:lvl9pPr marL="2880360" indent="0">
+              <a:buNone/>
+              <a:defRPr sz="1260">
                 <a:solidFill>
                   <a:schemeClr val="tx1">
                     <a:tint val="75000"/>
@@ -1055,7 +1062,7 @@
     </p:spTree>
     <p:extLst>
       <p:ext uri="{BB962C8B-B14F-4D97-AF65-F5344CB8AC3E}">
-        <p14:creationId xmlns:p14="http://schemas.microsoft.com/office/powerpoint/2010/main" val="368935961"/>
+        <p14:creationId xmlns:p14="http://schemas.microsoft.com/office/powerpoint/2010/main" val="1581777839"/>
       </p:ext>
     </p:extLst>
   </p:cSld>
@@ -1117,8 +1124,8 @@
         </p:nvSpPr>
         <p:spPr>
           <a:xfrm>
-            <a:off x="494953" y="958453"/>
-            <a:ext cx="3059708" cy="2284452"/>
+            <a:off x="544503" y="1437680"/>
+            <a:ext cx="3366016" cy="3426679"/>
           </a:xfrm>
         </p:spPr>
         <p:txBody>
@@ -1174,8 +1181,8 @@
         </p:nvSpPr>
         <p:spPr>
           <a:xfrm>
-            <a:off x="3644652" y="958453"/>
-            <a:ext cx="3059708" cy="2284452"/>
+            <a:off x="4009519" y="1437680"/>
+            <a:ext cx="3366016" cy="3426679"/>
           </a:xfrm>
         </p:spPr>
         <p:txBody>
@@ -1287,7 +1294,7 @@
     </p:spTree>
     <p:extLst>
       <p:ext uri="{BB962C8B-B14F-4D97-AF65-F5344CB8AC3E}">
-        <p14:creationId xmlns:p14="http://schemas.microsoft.com/office/powerpoint/2010/main" val="2184775120"/>
+        <p14:creationId xmlns:p14="http://schemas.microsoft.com/office/powerpoint/2010/main" val="1774292131"/>
       </p:ext>
     </p:extLst>
   </p:cSld>
@@ -1326,8 +1333,8 @@
         </p:nvSpPr>
         <p:spPr>
           <a:xfrm>
-            <a:off x="495891" y="191691"/>
-            <a:ext cx="6209407" cy="695921"/>
+            <a:off x="545534" y="287537"/>
+            <a:ext cx="6831033" cy="1043881"/>
           </a:xfrm>
         </p:spPr>
         <p:txBody>
@@ -1354,8 +1361,8 @@
         </p:nvSpPr>
         <p:spPr>
           <a:xfrm>
-            <a:off x="495891" y="882610"/>
-            <a:ext cx="3045647" cy="432554"/>
+            <a:off x="545535" y="1323916"/>
+            <a:ext cx="3350547" cy="648831"/>
           </a:xfrm>
         </p:spPr>
         <p:txBody>
@@ -1363,39 +1370,39 @@
           <a:lstStyle>
             <a:lvl1pPr marL="0" indent="0">
               <a:buNone/>
+              <a:defRPr sz="1890" b="1"/>
+            </a:lvl1pPr>
+            <a:lvl2pPr marL="360045" indent="0">
+              <a:buNone/>
+              <a:defRPr sz="1575" b="1"/>
+            </a:lvl2pPr>
+            <a:lvl3pPr marL="720090" indent="0">
+              <a:buNone/>
+              <a:defRPr sz="1418" b="1"/>
+            </a:lvl3pPr>
+            <a:lvl4pPr marL="1080135" indent="0">
+              <a:buNone/>
               <a:defRPr sz="1260" b="1"/>
-            </a:lvl1pPr>
-            <a:lvl2pPr marL="240030" indent="0">
-              <a:buNone/>
-              <a:defRPr sz="1050" b="1"/>
-            </a:lvl2pPr>
-            <a:lvl3pPr marL="480060" indent="0">
-              <a:buNone/>
-              <a:defRPr sz="945" b="1"/>
-            </a:lvl3pPr>
-            <a:lvl4pPr marL="720090" indent="0">
-              <a:buNone/>
-              <a:defRPr sz="840" b="1"/>
             </a:lvl4pPr>
-            <a:lvl5pPr marL="960120" indent="0">
-              <a:buNone/>
-              <a:defRPr sz="840" b="1"/>
+            <a:lvl5pPr marL="1440180" indent="0">
+              <a:buNone/>
+              <a:defRPr sz="1260" b="1"/>
             </a:lvl5pPr>
-            <a:lvl6pPr marL="1200150" indent="0">
-              <a:buNone/>
-              <a:defRPr sz="840" b="1"/>
+            <a:lvl6pPr marL="1800225" indent="0">
+              <a:buNone/>
+              <a:defRPr sz="1260" b="1"/>
             </a:lvl6pPr>
-            <a:lvl7pPr marL="1440180" indent="0">
-              <a:buNone/>
-              <a:defRPr sz="840" b="1"/>
+            <a:lvl7pPr marL="2160270" indent="0">
+              <a:buNone/>
+              <a:defRPr sz="1260" b="1"/>
             </a:lvl7pPr>
-            <a:lvl8pPr marL="1680210" indent="0">
-              <a:buNone/>
-              <a:defRPr sz="840" b="1"/>
+            <a:lvl8pPr marL="2520315" indent="0">
+              <a:buNone/>
+              <a:defRPr sz="1260" b="1"/>
             </a:lvl8pPr>
-            <a:lvl9pPr marL="1920240" indent="0">
-              <a:buNone/>
-              <a:defRPr sz="840" b="1"/>
+            <a:lvl9pPr marL="2880360" indent="0">
+              <a:buNone/>
+              <a:defRPr sz="1260" b="1"/>
             </a:lvl9pPr>
           </a:lstStyle>
           <a:p>
@@ -1419,8 +1426,8 @@
         </p:nvSpPr>
         <p:spPr>
           <a:xfrm>
-            <a:off x="495891" y="1315164"/>
-            <a:ext cx="3045647" cy="1934409"/>
+            <a:off x="545535" y="1972747"/>
+            <a:ext cx="3350547" cy="2901613"/>
           </a:xfrm>
         </p:spPr>
         <p:txBody>
@@ -1476,8 +1483,8 @@
         </p:nvSpPr>
         <p:spPr>
           <a:xfrm>
-            <a:off x="3644652" y="882610"/>
-            <a:ext cx="3060646" cy="432554"/>
+            <a:off x="4009520" y="1323916"/>
+            <a:ext cx="3367048" cy="648831"/>
           </a:xfrm>
         </p:spPr>
         <p:txBody>
@@ -1485,39 +1492,39 @@
           <a:lstStyle>
             <a:lvl1pPr marL="0" indent="0">
               <a:buNone/>
+              <a:defRPr sz="1890" b="1"/>
+            </a:lvl1pPr>
+            <a:lvl2pPr marL="360045" indent="0">
+              <a:buNone/>
+              <a:defRPr sz="1575" b="1"/>
+            </a:lvl2pPr>
+            <a:lvl3pPr marL="720090" indent="0">
+              <a:buNone/>
+              <a:defRPr sz="1418" b="1"/>
+            </a:lvl3pPr>
+            <a:lvl4pPr marL="1080135" indent="0">
+              <a:buNone/>
               <a:defRPr sz="1260" b="1"/>
-            </a:lvl1pPr>
-            <a:lvl2pPr marL="240030" indent="0">
-              <a:buNone/>
-              <a:defRPr sz="1050" b="1"/>
-            </a:lvl2pPr>
-            <a:lvl3pPr marL="480060" indent="0">
-              <a:buNone/>
-              <a:defRPr sz="945" b="1"/>
-            </a:lvl3pPr>
-            <a:lvl4pPr marL="720090" indent="0">
-              <a:buNone/>
-              <a:defRPr sz="840" b="1"/>
             </a:lvl4pPr>
-            <a:lvl5pPr marL="960120" indent="0">
-              <a:buNone/>
-              <a:defRPr sz="840" b="1"/>
+            <a:lvl5pPr marL="1440180" indent="0">
+              <a:buNone/>
+              <a:defRPr sz="1260" b="1"/>
             </a:lvl5pPr>
-            <a:lvl6pPr marL="1200150" indent="0">
-              <a:buNone/>
-              <a:defRPr sz="840" b="1"/>
+            <a:lvl6pPr marL="1800225" indent="0">
+              <a:buNone/>
+              <a:defRPr sz="1260" b="1"/>
             </a:lvl6pPr>
-            <a:lvl7pPr marL="1440180" indent="0">
-              <a:buNone/>
-              <a:defRPr sz="840" b="1"/>
+            <a:lvl7pPr marL="2160270" indent="0">
+              <a:buNone/>
+              <a:defRPr sz="1260" b="1"/>
             </a:lvl7pPr>
-            <a:lvl8pPr marL="1680210" indent="0">
-              <a:buNone/>
-              <a:defRPr sz="840" b="1"/>
+            <a:lvl8pPr marL="2520315" indent="0">
+              <a:buNone/>
+              <a:defRPr sz="1260" b="1"/>
             </a:lvl8pPr>
-            <a:lvl9pPr marL="1920240" indent="0">
-              <a:buNone/>
-              <a:defRPr sz="840" b="1"/>
+            <a:lvl9pPr marL="2880360" indent="0">
+              <a:buNone/>
+              <a:defRPr sz="1260" b="1"/>
             </a:lvl9pPr>
           </a:lstStyle>
           <a:p>
@@ -1541,8 +1548,8 @@
         </p:nvSpPr>
         <p:spPr>
           <a:xfrm>
-            <a:off x="3644652" y="1315164"/>
-            <a:ext cx="3060646" cy="1934409"/>
+            <a:off x="4009520" y="1972747"/>
+            <a:ext cx="3367048" cy="2901613"/>
           </a:xfrm>
         </p:spPr>
         <p:txBody>
@@ -1654,7 +1661,7 @@
     </p:spTree>
     <p:extLst>
       <p:ext uri="{BB962C8B-B14F-4D97-AF65-F5344CB8AC3E}">
-        <p14:creationId xmlns:p14="http://schemas.microsoft.com/office/powerpoint/2010/main" val="417856765"/>
+        <p14:creationId xmlns:p14="http://schemas.microsoft.com/office/powerpoint/2010/main" val="3670511254"/>
       </p:ext>
     </p:extLst>
   </p:cSld>
@@ -1772,7 +1779,7 @@
     </p:spTree>
     <p:extLst>
       <p:ext uri="{BB962C8B-B14F-4D97-AF65-F5344CB8AC3E}">
-        <p14:creationId xmlns:p14="http://schemas.microsoft.com/office/powerpoint/2010/main" val="524997706"/>
+        <p14:creationId xmlns:p14="http://schemas.microsoft.com/office/powerpoint/2010/main" val="529502750"/>
       </p:ext>
     </p:extLst>
   </p:cSld>
@@ -1867,7 +1874,7 @@
     </p:spTree>
     <p:extLst>
       <p:ext uri="{BB962C8B-B14F-4D97-AF65-F5344CB8AC3E}">
-        <p14:creationId xmlns:p14="http://schemas.microsoft.com/office/powerpoint/2010/main" val="1064059784"/>
+        <p14:creationId xmlns:p14="http://schemas.microsoft.com/office/powerpoint/2010/main" val="3348601597"/>
       </p:ext>
     </p:extLst>
   </p:cSld>
@@ -1906,15 +1913,15 @@
         </p:nvSpPr>
         <p:spPr>
           <a:xfrm>
-            <a:off x="495891" y="240030"/>
-            <a:ext cx="2321966" cy="840105"/>
+            <a:off x="545534" y="360045"/>
+            <a:ext cx="2554418" cy="1260158"/>
           </a:xfrm>
         </p:spPr>
         <p:txBody>
           <a:bodyPr anchor="b"/>
           <a:lstStyle>
             <a:lvl1pPr>
-              <a:defRPr sz="1680"/>
+              <a:defRPr sz="2520"/>
             </a:lvl1pPr>
           </a:lstStyle>
           <a:p>
@@ -1938,39 +1945,39 @@
         </p:nvSpPr>
         <p:spPr>
           <a:xfrm>
-            <a:off x="3060646" y="518398"/>
-            <a:ext cx="3644652" cy="2558653"/>
+            <a:off x="3367048" y="777598"/>
+            <a:ext cx="4009519" cy="3837980"/>
           </a:xfrm>
         </p:spPr>
         <p:txBody>
           <a:bodyPr/>
           <a:lstStyle>
             <a:lvl1pPr>
-              <a:defRPr sz="1680"/>
+              <a:defRPr sz="2520"/>
             </a:lvl1pPr>
             <a:lvl2pPr>
-              <a:defRPr sz="1470"/>
+              <a:defRPr sz="2205"/>
             </a:lvl2pPr>
             <a:lvl3pPr>
-              <a:defRPr sz="1260"/>
+              <a:defRPr sz="1890"/>
             </a:lvl3pPr>
             <a:lvl4pPr>
-              <a:defRPr sz="1050"/>
+              <a:defRPr sz="1575"/>
             </a:lvl4pPr>
             <a:lvl5pPr>
-              <a:defRPr sz="1050"/>
+              <a:defRPr sz="1575"/>
             </a:lvl5pPr>
             <a:lvl6pPr>
-              <a:defRPr sz="1050"/>
+              <a:defRPr sz="1575"/>
             </a:lvl6pPr>
             <a:lvl7pPr>
-              <a:defRPr sz="1050"/>
+              <a:defRPr sz="1575"/>
             </a:lvl7pPr>
             <a:lvl8pPr>
-              <a:defRPr sz="1050"/>
+              <a:defRPr sz="1575"/>
             </a:lvl8pPr>
             <a:lvl9pPr>
-              <a:defRPr sz="1050"/>
+              <a:defRPr sz="1575"/>
             </a:lvl9pPr>
           </a:lstStyle>
           <a:p>
@@ -2023,8 +2030,8 @@
         </p:nvSpPr>
         <p:spPr>
           <a:xfrm>
-            <a:off x="495891" y="1080135"/>
-            <a:ext cx="2321966" cy="2001084"/>
+            <a:off x="545534" y="1620202"/>
+            <a:ext cx="2554418" cy="3001626"/>
           </a:xfrm>
         </p:spPr>
         <p:txBody>
@@ -2032,39 +2039,39 @@
           <a:lstStyle>
             <a:lvl1pPr marL="0" indent="0">
               <a:buNone/>
-              <a:defRPr sz="840"/>
+              <a:defRPr sz="1260"/>
             </a:lvl1pPr>
-            <a:lvl2pPr marL="240030" indent="0">
-              <a:buNone/>
-              <a:defRPr sz="735"/>
+            <a:lvl2pPr marL="360045" indent="0">
+              <a:buNone/>
+              <a:defRPr sz="1103"/>
             </a:lvl2pPr>
-            <a:lvl3pPr marL="480060" indent="0">
-              <a:buNone/>
-              <a:defRPr sz="630"/>
+            <a:lvl3pPr marL="720090" indent="0">
+              <a:buNone/>
+              <a:defRPr sz="945"/>
             </a:lvl3pPr>
-            <a:lvl4pPr marL="720090" indent="0">
-              <a:buNone/>
-              <a:defRPr sz="525"/>
+            <a:lvl4pPr marL="1080135" indent="0">
+              <a:buNone/>
+              <a:defRPr sz="788"/>
             </a:lvl4pPr>
-            <a:lvl5pPr marL="960120" indent="0">
-              <a:buNone/>
-              <a:defRPr sz="525"/>
+            <a:lvl5pPr marL="1440180" indent="0">
+              <a:buNone/>
+              <a:defRPr sz="788"/>
             </a:lvl5pPr>
-            <a:lvl6pPr marL="1200150" indent="0">
-              <a:buNone/>
-              <a:defRPr sz="525"/>
+            <a:lvl6pPr marL="1800225" indent="0">
+              <a:buNone/>
+              <a:defRPr sz="788"/>
             </a:lvl6pPr>
-            <a:lvl7pPr marL="1440180" indent="0">
-              <a:buNone/>
-              <a:defRPr sz="525"/>
+            <a:lvl7pPr marL="2160270" indent="0">
+              <a:buNone/>
+              <a:defRPr sz="788"/>
             </a:lvl7pPr>
-            <a:lvl8pPr marL="1680210" indent="0">
-              <a:buNone/>
-              <a:defRPr sz="525"/>
+            <a:lvl8pPr marL="2520315" indent="0">
+              <a:buNone/>
+              <a:defRPr sz="788"/>
             </a:lvl8pPr>
-            <a:lvl9pPr marL="1920240" indent="0">
-              <a:buNone/>
-              <a:defRPr sz="525"/>
+            <a:lvl9pPr marL="2880360" indent="0">
+              <a:buNone/>
+              <a:defRPr sz="788"/>
             </a:lvl9pPr>
           </a:lstStyle>
           <a:p>
@@ -2144,7 +2151,7 @@
     </p:spTree>
     <p:extLst>
       <p:ext uri="{BB962C8B-B14F-4D97-AF65-F5344CB8AC3E}">
-        <p14:creationId xmlns:p14="http://schemas.microsoft.com/office/powerpoint/2010/main" val="3245286985"/>
+        <p14:creationId xmlns:p14="http://schemas.microsoft.com/office/powerpoint/2010/main" val="909101012"/>
       </p:ext>
     </p:extLst>
   </p:cSld>
@@ -2183,15 +2190,15 @@
         </p:nvSpPr>
         <p:spPr>
           <a:xfrm>
-            <a:off x="495891" y="240030"/>
-            <a:ext cx="2321966" cy="840105"/>
+            <a:off x="545534" y="360045"/>
+            <a:ext cx="2554418" cy="1260158"/>
           </a:xfrm>
         </p:spPr>
         <p:txBody>
           <a:bodyPr anchor="b"/>
           <a:lstStyle>
             <a:lvl1pPr>
-              <a:defRPr sz="1680"/>
+              <a:defRPr sz="2520"/>
             </a:lvl1pPr>
           </a:lstStyle>
           <a:p>
@@ -2215,8 +2222,8 @@
         </p:nvSpPr>
         <p:spPr>
           <a:xfrm>
-            <a:off x="3060646" y="518398"/>
-            <a:ext cx="3644652" cy="2558653"/>
+            <a:off x="3367048" y="777598"/>
+            <a:ext cx="4009519" cy="3837980"/>
           </a:xfrm>
         </p:spPr>
         <p:txBody>
@@ -2224,39 +2231,39 @@
           <a:lstStyle>
             <a:lvl1pPr marL="0" indent="0">
               <a:buNone/>
-              <a:defRPr sz="1680"/>
+              <a:defRPr sz="2520"/>
             </a:lvl1pPr>
-            <a:lvl2pPr marL="240030" indent="0">
-              <a:buNone/>
-              <a:defRPr sz="1470"/>
+            <a:lvl2pPr marL="360045" indent="0">
+              <a:buNone/>
+              <a:defRPr sz="2205"/>
             </a:lvl2pPr>
-            <a:lvl3pPr marL="480060" indent="0">
-              <a:buNone/>
-              <a:defRPr sz="1260"/>
+            <a:lvl3pPr marL="720090" indent="0">
+              <a:buNone/>
+              <a:defRPr sz="1890"/>
             </a:lvl3pPr>
-            <a:lvl4pPr marL="720090" indent="0">
-              <a:buNone/>
-              <a:defRPr sz="1050"/>
+            <a:lvl4pPr marL="1080135" indent="0">
+              <a:buNone/>
+              <a:defRPr sz="1575"/>
             </a:lvl4pPr>
-            <a:lvl5pPr marL="960120" indent="0">
-              <a:buNone/>
-              <a:defRPr sz="1050"/>
+            <a:lvl5pPr marL="1440180" indent="0">
+              <a:buNone/>
+              <a:defRPr sz="1575"/>
             </a:lvl5pPr>
-            <a:lvl6pPr marL="1200150" indent="0">
-              <a:buNone/>
-              <a:defRPr sz="1050"/>
+            <a:lvl6pPr marL="1800225" indent="0">
+              <a:buNone/>
+              <a:defRPr sz="1575"/>
             </a:lvl6pPr>
-            <a:lvl7pPr marL="1440180" indent="0">
-              <a:buNone/>
-              <a:defRPr sz="1050"/>
+            <a:lvl7pPr marL="2160270" indent="0">
+              <a:buNone/>
+              <a:defRPr sz="1575"/>
             </a:lvl7pPr>
-            <a:lvl8pPr marL="1680210" indent="0">
-              <a:buNone/>
-              <a:defRPr sz="1050"/>
+            <a:lvl8pPr marL="2520315" indent="0">
+              <a:buNone/>
+              <a:defRPr sz="1575"/>
             </a:lvl8pPr>
-            <a:lvl9pPr marL="1920240" indent="0">
-              <a:buNone/>
-              <a:defRPr sz="1050"/>
+            <a:lvl9pPr marL="2880360" indent="0">
+              <a:buNone/>
+              <a:defRPr sz="1575"/>
             </a:lvl9pPr>
           </a:lstStyle>
           <a:p>
@@ -2280,8 +2287,8 @@
         </p:nvSpPr>
         <p:spPr>
           <a:xfrm>
-            <a:off x="495891" y="1080135"/>
-            <a:ext cx="2321966" cy="2001084"/>
+            <a:off x="545534" y="1620202"/>
+            <a:ext cx="2554418" cy="3001626"/>
           </a:xfrm>
         </p:spPr>
         <p:txBody>
@@ -2289,39 +2296,39 @@
           <a:lstStyle>
             <a:lvl1pPr marL="0" indent="0">
               <a:buNone/>
-              <a:defRPr sz="840"/>
+              <a:defRPr sz="1260"/>
             </a:lvl1pPr>
-            <a:lvl2pPr marL="240030" indent="0">
-              <a:buNone/>
-              <a:defRPr sz="735"/>
+            <a:lvl2pPr marL="360045" indent="0">
+              <a:buNone/>
+              <a:defRPr sz="1103"/>
             </a:lvl2pPr>
-            <a:lvl3pPr marL="480060" indent="0">
-              <a:buNone/>
-              <a:defRPr sz="630"/>
+            <a:lvl3pPr marL="720090" indent="0">
+              <a:buNone/>
+              <a:defRPr sz="945"/>
             </a:lvl3pPr>
-            <a:lvl4pPr marL="720090" indent="0">
-              <a:buNone/>
-              <a:defRPr sz="525"/>
+            <a:lvl4pPr marL="1080135" indent="0">
+              <a:buNone/>
+              <a:defRPr sz="788"/>
             </a:lvl4pPr>
-            <a:lvl5pPr marL="960120" indent="0">
-              <a:buNone/>
-              <a:defRPr sz="525"/>
+            <a:lvl5pPr marL="1440180" indent="0">
+              <a:buNone/>
+              <a:defRPr sz="788"/>
             </a:lvl5pPr>
-            <a:lvl6pPr marL="1200150" indent="0">
-              <a:buNone/>
-              <a:defRPr sz="525"/>
+            <a:lvl6pPr marL="1800225" indent="0">
+              <a:buNone/>
+              <a:defRPr sz="788"/>
             </a:lvl6pPr>
-            <a:lvl7pPr marL="1440180" indent="0">
-              <a:buNone/>
-              <a:defRPr sz="525"/>
+            <a:lvl7pPr marL="2160270" indent="0">
+              <a:buNone/>
+              <a:defRPr sz="788"/>
             </a:lvl7pPr>
-            <a:lvl8pPr marL="1680210" indent="0">
-              <a:buNone/>
-              <a:defRPr sz="525"/>
+            <a:lvl8pPr marL="2520315" indent="0">
+              <a:buNone/>
+              <a:defRPr sz="788"/>
             </a:lvl8pPr>
-            <a:lvl9pPr marL="1920240" indent="0">
-              <a:buNone/>
-              <a:defRPr sz="525"/>
+            <a:lvl9pPr marL="2880360" indent="0">
+              <a:buNone/>
+              <a:defRPr sz="788"/>
             </a:lvl9pPr>
           </a:lstStyle>
           <a:p>
@@ -2401,7 +2408,7 @@
     </p:spTree>
     <p:extLst>
       <p:ext uri="{BB962C8B-B14F-4D97-AF65-F5344CB8AC3E}">
-        <p14:creationId xmlns:p14="http://schemas.microsoft.com/office/powerpoint/2010/main" val="2170512986"/>
+        <p14:creationId xmlns:p14="http://schemas.microsoft.com/office/powerpoint/2010/main" val="114632318"/>
       </p:ext>
     </p:extLst>
   </p:cSld>
@@ -2445,8 +2452,8 @@
         </p:nvSpPr>
         <p:spPr>
           <a:xfrm>
-            <a:off x="494953" y="191691"/>
-            <a:ext cx="6209407" cy="695921"/>
+            <a:off x="544503" y="287537"/>
+            <a:ext cx="6831033" cy="1043881"/>
           </a:xfrm>
           <a:prstGeom prst="rect">
             <a:avLst/>
@@ -2478,8 +2485,8 @@
         </p:nvSpPr>
         <p:spPr>
           <a:xfrm>
-            <a:off x="494953" y="958453"/>
-            <a:ext cx="6209407" cy="2284452"/>
+            <a:off x="544503" y="1437680"/>
+            <a:ext cx="6831033" cy="3426679"/>
           </a:xfrm>
           <a:prstGeom prst="rect">
             <a:avLst/>
@@ -2540,8 +2547,8 @@
         </p:nvSpPr>
         <p:spPr>
           <a:xfrm>
-            <a:off x="494953" y="3337084"/>
-            <a:ext cx="1619845" cy="191691"/>
+            <a:off x="544502" y="5005627"/>
+            <a:ext cx="1782009" cy="287536"/>
           </a:xfrm>
           <a:prstGeom prst="rect">
             <a:avLst/>
@@ -2551,7 +2558,7 @@
           <a:bodyPr vert="horz" lIns="91440" tIns="45720" rIns="91440" bIns="45720" rtlCol="0" anchor="ctr"/>
           <a:lstStyle>
             <a:lvl1pPr algn="l">
-              <a:defRPr sz="630">
+              <a:defRPr sz="945">
                 <a:solidFill>
                   <a:schemeClr val="tx1">
                     <a:tint val="75000"/>
@@ -2581,8 +2588,8 @@
         </p:nvSpPr>
         <p:spPr>
           <a:xfrm>
-            <a:off x="2384773" y="3337084"/>
-            <a:ext cx="2429768" cy="191691"/>
+            <a:off x="2623513" y="5005627"/>
+            <a:ext cx="2673013" cy="287536"/>
           </a:xfrm>
           <a:prstGeom prst="rect">
             <a:avLst/>
@@ -2592,7 +2599,7 @@
           <a:bodyPr vert="horz" lIns="91440" tIns="45720" rIns="91440" bIns="45720" rtlCol="0" anchor="ctr"/>
           <a:lstStyle>
             <a:lvl1pPr algn="ctr">
-              <a:defRPr sz="630">
+              <a:defRPr sz="945">
                 <a:solidFill>
                   <a:schemeClr val="tx1">
                     <a:tint val="75000"/>
@@ -2618,8 +2625,8 @@
         </p:nvSpPr>
         <p:spPr>
           <a:xfrm>
-            <a:off x="5084515" y="3337084"/>
-            <a:ext cx="1619845" cy="191691"/>
+            <a:off x="5593527" y="5005627"/>
+            <a:ext cx="1782009" cy="287536"/>
           </a:xfrm>
           <a:prstGeom prst="rect">
             <a:avLst/>
@@ -2629,7 +2636,7 @@
           <a:bodyPr vert="horz" lIns="91440" tIns="45720" rIns="91440" bIns="45720" rtlCol="0" anchor="ctr"/>
           <a:lstStyle>
             <a:lvl1pPr algn="r">
-              <a:defRPr sz="630">
+              <a:defRPr sz="945">
                 <a:solidFill>
                   <a:schemeClr val="tx1">
                     <a:tint val="75000"/>
@@ -2650,27 +2657,27 @@
     </p:spTree>
     <p:extLst>
       <p:ext uri="{BB962C8B-B14F-4D97-AF65-F5344CB8AC3E}">
-        <p14:creationId xmlns:p14="http://schemas.microsoft.com/office/powerpoint/2010/main" val="4029659175"/>
+        <p14:creationId xmlns:p14="http://schemas.microsoft.com/office/powerpoint/2010/main" val="2117566786"/>
       </p:ext>
     </p:extLst>
   </p:cSld>
   <p:clrMap bg1="lt1" tx1="dk1" bg2="lt2" tx2="dk2" accent1="accent1" accent2="accent2" accent3="accent3" accent4="accent4" accent5="accent5" accent6="accent6" hlink="hlink" folHlink="folHlink"/>
   <p:sldLayoutIdLst>
-    <p:sldLayoutId id="2147483685" r:id="rId1"/>
-    <p:sldLayoutId id="2147483686" r:id="rId2"/>
-    <p:sldLayoutId id="2147483687" r:id="rId3"/>
-    <p:sldLayoutId id="2147483688" r:id="rId4"/>
-    <p:sldLayoutId id="2147483689" r:id="rId5"/>
-    <p:sldLayoutId id="2147483690" r:id="rId6"/>
-    <p:sldLayoutId id="2147483691" r:id="rId7"/>
-    <p:sldLayoutId id="2147483692" r:id="rId8"/>
-    <p:sldLayoutId id="2147483693" r:id="rId9"/>
-    <p:sldLayoutId id="2147483694" r:id="rId10"/>
-    <p:sldLayoutId id="2147483695" r:id="rId11"/>
+    <p:sldLayoutId id="2147483709" r:id="rId1"/>
+    <p:sldLayoutId id="2147483710" r:id="rId2"/>
+    <p:sldLayoutId id="2147483711" r:id="rId3"/>
+    <p:sldLayoutId id="2147483712" r:id="rId4"/>
+    <p:sldLayoutId id="2147483713" r:id="rId5"/>
+    <p:sldLayoutId id="2147483714" r:id="rId6"/>
+    <p:sldLayoutId id="2147483715" r:id="rId7"/>
+    <p:sldLayoutId id="2147483716" r:id="rId8"/>
+    <p:sldLayoutId id="2147483717" r:id="rId9"/>
+    <p:sldLayoutId id="2147483718" r:id="rId10"/>
+    <p:sldLayoutId id="2147483719" r:id="rId11"/>
   </p:sldLayoutIdLst>
   <p:txStyles>
     <p:titleStyle>
-      <a:lvl1pPr algn="l" defTabSz="480060" rtl="0" eaLnBrk="1" latinLnBrk="0" hangingPunct="1">
+      <a:lvl1pPr algn="l" defTabSz="720090" rtl="0" eaLnBrk="1" latinLnBrk="0" hangingPunct="1">
         <a:lnSpc>
           <a:spcPct val="90000"/>
         </a:lnSpc>
@@ -2678,7 +2685,7 @@
           <a:spcPct val="0"/>
         </a:spcBef>
         <a:buNone/>
-        <a:defRPr sz="2310" kern="1200">
+        <a:defRPr sz="3465" kern="1200">
           <a:solidFill>
             <a:schemeClr val="tx1"/>
           </a:solidFill>
@@ -2689,16 +2696,16 @@
       </a:lvl1pPr>
     </p:titleStyle>
     <p:bodyStyle>
-      <a:lvl1pPr marL="120015" indent="-120015" algn="l" defTabSz="480060" rtl="0" eaLnBrk="1" latinLnBrk="0" hangingPunct="1">
+      <a:lvl1pPr marL="180023" indent="-180023" algn="l" defTabSz="720090" rtl="0" eaLnBrk="1" latinLnBrk="0" hangingPunct="1">
         <a:lnSpc>
           <a:spcPct val="90000"/>
         </a:lnSpc>
         <a:spcBef>
-          <a:spcPts val="525"/>
+          <a:spcPts val="788"/>
         </a:spcBef>
         <a:buFont typeface="Arial" panose="020B0604020202020204" pitchFamily="34" charset="0"/>
         <a:buChar char="•"/>
-        <a:defRPr sz="1470" kern="1200">
+        <a:defRPr sz="2205" kern="1200">
           <a:solidFill>
             <a:schemeClr val="tx1"/>
           </a:solidFill>
@@ -2707,16 +2714,16 @@
           <a:cs typeface="+mn-cs"/>
         </a:defRPr>
       </a:lvl1pPr>
-      <a:lvl2pPr marL="360045" indent="-120015" algn="l" defTabSz="480060" rtl="0" eaLnBrk="1" latinLnBrk="0" hangingPunct="1">
+      <a:lvl2pPr marL="540068" indent="-180023" algn="l" defTabSz="720090" rtl="0" eaLnBrk="1" latinLnBrk="0" hangingPunct="1">
         <a:lnSpc>
           <a:spcPct val="90000"/>
         </a:lnSpc>
         <a:spcBef>
-          <a:spcPts val="263"/>
+          <a:spcPts val="394"/>
         </a:spcBef>
         <a:buFont typeface="Arial" panose="020B0604020202020204" pitchFamily="34" charset="0"/>
         <a:buChar char="•"/>
-        <a:defRPr sz="1260" kern="1200">
+        <a:defRPr sz="1890" kern="1200">
           <a:solidFill>
             <a:schemeClr val="tx1"/>
           </a:solidFill>
@@ -2725,16 +2732,16 @@
           <a:cs typeface="+mn-cs"/>
         </a:defRPr>
       </a:lvl2pPr>
-      <a:lvl3pPr marL="600075" indent="-120015" algn="l" defTabSz="480060" rtl="0" eaLnBrk="1" latinLnBrk="0" hangingPunct="1">
+      <a:lvl3pPr marL="900113" indent="-180023" algn="l" defTabSz="720090" rtl="0" eaLnBrk="1" latinLnBrk="0" hangingPunct="1">
         <a:lnSpc>
           <a:spcPct val="90000"/>
         </a:lnSpc>
         <a:spcBef>
-          <a:spcPts val="263"/>
+          <a:spcPts val="394"/>
         </a:spcBef>
         <a:buFont typeface="Arial" panose="020B0604020202020204" pitchFamily="34" charset="0"/>
         <a:buChar char="•"/>
-        <a:defRPr sz="1050" kern="1200">
+        <a:defRPr sz="1575" kern="1200">
           <a:solidFill>
             <a:schemeClr val="tx1"/>
           </a:solidFill>
@@ -2743,16 +2750,16 @@
           <a:cs typeface="+mn-cs"/>
         </a:defRPr>
       </a:lvl3pPr>
-      <a:lvl4pPr marL="840105" indent="-120015" algn="l" defTabSz="480060" rtl="0" eaLnBrk="1" latinLnBrk="0" hangingPunct="1">
+      <a:lvl4pPr marL="1260158" indent="-180023" algn="l" defTabSz="720090" rtl="0" eaLnBrk="1" latinLnBrk="0" hangingPunct="1">
         <a:lnSpc>
           <a:spcPct val="90000"/>
         </a:lnSpc>
         <a:spcBef>
-          <a:spcPts val="263"/>
+          <a:spcPts val="394"/>
         </a:spcBef>
         <a:buFont typeface="Arial" panose="020B0604020202020204" pitchFamily="34" charset="0"/>
         <a:buChar char="•"/>
-        <a:defRPr sz="945" kern="1200">
+        <a:defRPr sz="1418" kern="1200">
           <a:solidFill>
             <a:schemeClr val="tx1"/>
           </a:solidFill>
@@ -2761,16 +2768,16 @@
           <a:cs typeface="+mn-cs"/>
         </a:defRPr>
       </a:lvl4pPr>
-      <a:lvl5pPr marL="1080135" indent="-120015" algn="l" defTabSz="480060" rtl="0" eaLnBrk="1" latinLnBrk="0" hangingPunct="1">
+      <a:lvl5pPr marL="1620203" indent="-180023" algn="l" defTabSz="720090" rtl="0" eaLnBrk="1" latinLnBrk="0" hangingPunct="1">
         <a:lnSpc>
           <a:spcPct val="90000"/>
         </a:lnSpc>
         <a:spcBef>
-          <a:spcPts val="263"/>
+          <a:spcPts val="394"/>
         </a:spcBef>
         <a:buFont typeface="Arial" panose="020B0604020202020204" pitchFamily="34" charset="0"/>
         <a:buChar char="•"/>
-        <a:defRPr sz="945" kern="1200">
+        <a:defRPr sz="1418" kern="1200">
           <a:solidFill>
             <a:schemeClr val="tx1"/>
           </a:solidFill>
@@ -2779,16 +2786,16 @@
           <a:cs typeface="+mn-cs"/>
         </a:defRPr>
       </a:lvl5pPr>
-      <a:lvl6pPr marL="1320165" indent="-120015" algn="l" defTabSz="480060" rtl="0" eaLnBrk="1" latinLnBrk="0" hangingPunct="1">
+      <a:lvl6pPr marL="1980248" indent="-180023" algn="l" defTabSz="720090" rtl="0" eaLnBrk="1" latinLnBrk="0" hangingPunct="1">
         <a:lnSpc>
           <a:spcPct val="90000"/>
         </a:lnSpc>
         <a:spcBef>
-          <a:spcPts val="263"/>
+          <a:spcPts val="394"/>
         </a:spcBef>
         <a:buFont typeface="Arial" panose="020B0604020202020204" pitchFamily="34" charset="0"/>
         <a:buChar char="•"/>
-        <a:defRPr sz="945" kern="1200">
+        <a:defRPr sz="1418" kern="1200">
           <a:solidFill>
             <a:schemeClr val="tx1"/>
           </a:solidFill>
@@ -2797,16 +2804,16 @@
           <a:cs typeface="+mn-cs"/>
         </a:defRPr>
       </a:lvl6pPr>
-      <a:lvl7pPr marL="1560195" indent="-120015" algn="l" defTabSz="480060" rtl="0" eaLnBrk="1" latinLnBrk="0" hangingPunct="1">
+      <a:lvl7pPr marL="2340293" indent="-180023" algn="l" defTabSz="720090" rtl="0" eaLnBrk="1" latinLnBrk="0" hangingPunct="1">
         <a:lnSpc>
           <a:spcPct val="90000"/>
         </a:lnSpc>
         <a:spcBef>
-          <a:spcPts val="263"/>
+          <a:spcPts val="394"/>
         </a:spcBef>
         <a:buFont typeface="Arial" panose="020B0604020202020204" pitchFamily="34" charset="0"/>
         <a:buChar char="•"/>
-        <a:defRPr sz="945" kern="1200">
+        <a:defRPr sz="1418" kern="1200">
           <a:solidFill>
             <a:schemeClr val="tx1"/>
           </a:solidFill>
@@ -2815,16 +2822,16 @@
           <a:cs typeface="+mn-cs"/>
         </a:defRPr>
       </a:lvl7pPr>
-      <a:lvl8pPr marL="1800225" indent="-120015" algn="l" defTabSz="480060" rtl="0" eaLnBrk="1" latinLnBrk="0" hangingPunct="1">
+      <a:lvl8pPr marL="2700338" indent="-180023" algn="l" defTabSz="720090" rtl="0" eaLnBrk="1" latinLnBrk="0" hangingPunct="1">
         <a:lnSpc>
           <a:spcPct val="90000"/>
         </a:lnSpc>
         <a:spcBef>
-          <a:spcPts val="263"/>
+          <a:spcPts val="394"/>
         </a:spcBef>
         <a:buFont typeface="Arial" panose="020B0604020202020204" pitchFamily="34" charset="0"/>
         <a:buChar char="•"/>
-        <a:defRPr sz="945" kern="1200">
+        <a:defRPr sz="1418" kern="1200">
           <a:solidFill>
             <a:schemeClr val="tx1"/>
           </a:solidFill>
@@ -2833,16 +2840,16 @@
           <a:cs typeface="+mn-cs"/>
         </a:defRPr>
       </a:lvl8pPr>
-      <a:lvl9pPr marL="2040255" indent="-120015" algn="l" defTabSz="480060" rtl="0" eaLnBrk="1" latinLnBrk="0" hangingPunct="1">
+      <a:lvl9pPr marL="3060383" indent="-180023" algn="l" defTabSz="720090" rtl="0" eaLnBrk="1" latinLnBrk="0" hangingPunct="1">
         <a:lnSpc>
           <a:spcPct val="90000"/>
         </a:lnSpc>
         <a:spcBef>
-          <a:spcPts val="263"/>
+          <a:spcPts val="394"/>
         </a:spcBef>
         <a:buFont typeface="Arial" panose="020B0604020202020204" pitchFamily="34" charset="0"/>
         <a:buChar char="•"/>
-        <a:defRPr sz="945" kern="1200">
+        <a:defRPr sz="1418" kern="1200">
           <a:solidFill>
             <a:schemeClr val="tx1"/>
           </a:solidFill>
@@ -2856,8 +2863,8 @@
       <a:defPPr>
         <a:defRPr lang="en-US"/>
       </a:defPPr>
-      <a:lvl1pPr marL="0" algn="l" defTabSz="480060" rtl="0" eaLnBrk="1" latinLnBrk="0" hangingPunct="1">
-        <a:defRPr sz="945" kern="1200">
+      <a:lvl1pPr marL="0" algn="l" defTabSz="720090" rtl="0" eaLnBrk="1" latinLnBrk="0" hangingPunct="1">
+        <a:defRPr sz="1418" kern="1200">
           <a:solidFill>
             <a:schemeClr val="tx1"/>
           </a:solidFill>
@@ -2866,8 +2873,8 @@
           <a:cs typeface="+mn-cs"/>
         </a:defRPr>
       </a:lvl1pPr>
-      <a:lvl2pPr marL="240030" algn="l" defTabSz="480060" rtl="0" eaLnBrk="1" latinLnBrk="0" hangingPunct="1">
-        <a:defRPr sz="945" kern="1200">
+      <a:lvl2pPr marL="360045" algn="l" defTabSz="720090" rtl="0" eaLnBrk="1" latinLnBrk="0" hangingPunct="1">
+        <a:defRPr sz="1418" kern="1200">
           <a:solidFill>
             <a:schemeClr val="tx1"/>
           </a:solidFill>
@@ -2876,8 +2883,8 @@
           <a:cs typeface="+mn-cs"/>
         </a:defRPr>
       </a:lvl2pPr>
-      <a:lvl3pPr marL="480060" algn="l" defTabSz="480060" rtl="0" eaLnBrk="1" latinLnBrk="0" hangingPunct="1">
-        <a:defRPr sz="945" kern="1200">
+      <a:lvl3pPr marL="720090" algn="l" defTabSz="720090" rtl="0" eaLnBrk="1" latinLnBrk="0" hangingPunct="1">
+        <a:defRPr sz="1418" kern="1200">
           <a:solidFill>
             <a:schemeClr val="tx1"/>
           </a:solidFill>
@@ -2886,8 +2893,8 @@
           <a:cs typeface="+mn-cs"/>
         </a:defRPr>
       </a:lvl3pPr>
-      <a:lvl4pPr marL="720090" algn="l" defTabSz="480060" rtl="0" eaLnBrk="1" latinLnBrk="0" hangingPunct="1">
-        <a:defRPr sz="945" kern="1200">
+      <a:lvl4pPr marL="1080135" algn="l" defTabSz="720090" rtl="0" eaLnBrk="1" latinLnBrk="0" hangingPunct="1">
+        <a:defRPr sz="1418" kern="1200">
           <a:solidFill>
             <a:schemeClr val="tx1"/>
           </a:solidFill>
@@ -2896,8 +2903,8 @@
           <a:cs typeface="+mn-cs"/>
         </a:defRPr>
       </a:lvl4pPr>
-      <a:lvl5pPr marL="960120" algn="l" defTabSz="480060" rtl="0" eaLnBrk="1" latinLnBrk="0" hangingPunct="1">
-        <a:defRPr sz="945" kern="1200">
+      <a:lvl5pPr marL="1440180" algn="l" defTabSz="720090" rtl="0" eaLnBrk="1" latinLnBrk="0" hangingPunct="1">
+        <a:defRPr sz="1418" kern="1200">
           <a:solidFill>
             <a:schemeClr val="tx1"/>
           </a:solidFill>
@@ -2906,8 +2913,8 @@
           <a:cs typeface="+mn-cs"/>
         </a:defRPr>
       </a:lvl5pPr>
-      <a:lvl6pPr marL="1200150" algn="l" defTabSz="480060" rtl="0" eaLnBrk="1" latinLnBrk="0" hangingPunct="1">
-        <a:defRPr sz="945" kern="1200">
+      <a:lvl6pPr marL="1800225" algn="l" defTabSz="720090" rtl="0" eaLnBrk="1" latinLnBrk="0" hangingPunct="1">
+        <a:defRPr sz="1418" kern="1200">
           <a:solidFill>
             <a:schemeClr val="tx1"/>
           </a:solidFill>
@@ -2916,8 +2923,8 @@
           <a:cs typeface="+mn-cs"/>
         </a:defRPr>
       </a:lvl6pPr>
-      <a:lvl7pPr marL="1440180" algn="l" defTabSz="480060" rtl="0" eaLnBrk="1" latinLnBrk="0" hangingPunct="1">
-        <a:defRPr sz="945" kern="1200">
+      <a:lvl7pPr marL="2160270" algn="l" defTabSz="720090" rtl="0" eaLnBrk="1" latinLnBrk="0" hangingPunct="1">
+        <a:defRPr sz="1418" kern="1200">
           <a:solidFill>
             <a:schemeClr val="tx1"/>
           </a:solidFill>
@@ -2926,8 +2933,8 @@
           <a:cs typeface="+mn-cs"/>
         </a:defRPr>
       </a:lvl7pPr>
-      <a:lvl8pPr marL="1680210" algn="l" defTabSz="480060" rtl="0" eaLnBrk="1" latinLnBrk="0" hangingPunct="1">
-        <a:defRPr sz="945" kern="1200">
+      <a:lvl8pPr marL="2520315" algn="l" defTabSz="720090" rtl="0" eaLnBrk="1" latinLnBrk="0" hangingPunct="1">
+        <a:defRPr sz="1418" kern="1200">
           <a:solidFill>
             <a:schemeClr val="tx1"/>
           </a:solidFill>
@@ -2936,8 +2943,8 @@
           <a:cs typeface="+mn-cs"/>
         </a:defRPr>
       </a:lvl8pPr>
-      <a:lvl9pPr marL="1920240" algn="l" defTabSz="480060" rtl="0" eaLnBrk="1" latinLnBrk="0" hangingPunct="1">
-        <a:defRPr sz="945" kern="1200">
+      <a:lvl9pPr marL="2880360" algn="l" defTabSz="720090" rtl="0" eaLnBrk="1" latinLnBrk="0" hangingPunct="1">
+        <a:defRPr sz="1418" kern="1200">
           <a:solidFill>
             <a:schemeClr val="tx1"/>
           </a:solidFill>
@@ -2982,7 +2989,7 @@
         </p:nvSpPr>
         <p:spPr>
           <a:xfrm>
-            <a:off x="314326" y="384570"/>
+            <a:off x="436564" y="403622"/>
             <a:ext cx="1466850" cy="771525"/>
           </a:xfrm>
           <a:prstGeom prst="flowChartAlternateProcess">
@@ -3016,14 +3023,14 @@
           <a:p>
             <a:pPr algn="ctr"/>
             <a:r>
-              <a:rPr lang="en-GB"/>
+              <a:rPr lang="en-GB" dirty="0"/>
               <a:t>Maria</a:t>
             </a:r>
           </a:p>
           <a:p>
             <a:pPr algn="ctr"/>
             <a:r>
-              <a:rPr lang="en-GB"/>
+              <a:rPr lang="en-GB" dirty="0"/>
               <a:t>Map Maker</a:t>
             </a:r>
           </a:p>
@@ -3043,7 +3050,7 @@
         </p:nvSpPr>
         <p:spPr>
           <a:xfrm>
-            <a:off x="3609983" y="366415"/>
+            <a:off x="3626645" y="1465654"/>
             <a:ext cx="1343025" cy="671512"/>
           </a:xfrm>
           <a:prstGeom prst="ellipse">
@@ -3097,7 +3104,7 @@
         </p:nvSpPr>
         <p:spPr>
           <a:xfrm>
-            <a:off x="2832100" y="1128713"/>
+            <a:off x="2848762" y="2433638"/>
             <a:ext cx="1343025" cy="671512"/>
           </a:xfrm>
           <a:prstGeom prst="ellipse">
@@ -3151,7 +3158,7 @@
         </p:nvSpPr>
         <p:spPr>
           <a:xfrm>
-            <a:off x="4467224" y="1128713"/>
+            <a:off x="4483886" y="2433638"/>
             <a:ext cx="1343025" cy="671512"/>
           </a:xfrm>
           <a:prstGeom prst="ellipse">
@@ -3205,7 +3212,7 @@
         </p:nvSpPr>
         <p:spPr>
           <a:xfrm>
-            <a:off x="5683257" y="1464469"/>
+            <a:off x="6487320" y="3439123"/>
             <a:ext cx="1343025" cy="671512"/>
           </a:xfrm>
           <a:prstGeom prst="ellipse">
@@ -3259,7 +3266,7 @@
         </p:nvGrpSpPr>
         <p:grpSpPr>
           <a:xfrm flipH="1">
-            <a:off x="3154361" y="1981798"/>
+            <a:off x="3223420" y="3439123"/>
             <a:ext cx="1495425" cy="823912"/>
             <a:chOff x="1828802" y="2444355"/>
             <a:chExt cx="1495425" cy="823912"/>
@@ -3454,7 +3461,7 @@
         </p:nvGrpSpPr>
         <p:grpSpPr>
           <a:xfrm>
-            <a:off x="4876808" y="2134198"/>
+            <a:off x="4893470" y="3439123"/>
             <a:ext cx="1495425" cy="823912"/>
             <a:chOff x="5000630" y="2395537"/>
             <a:chExt cx="1495425" cy="823912"/>
@@ -3649,7 +3656,7 @@
         </p:nvSpPr>
         <p:spPr>
           <a:xfrm>
-            <a:off x="1006471" y="1981798"/>
+            <a:off x="1023133" y="3286723"/>
             <a:ext cx="1343025" cy="671512"/>
           </a:xfrm>
           <a:prstGeom prst="ellipse">
@@ -3703,7 +3710,7 @@
         </p:nvSpPr>
         <p:spPr>
           <a:xfrm flipH="1">
-            <a:off x="200022" y="2750347"/>
+            <a:off x="216684" y="4055272"/>
             <a:ext cx="1343025" cy="671512"/>
           </a:xfrm>
           <a:prstGeom prst="ellipse">
@@ -3757,7 +3764,7 @@
         </p:nvSpPr>
         <p:spPr>
           <a:xfrm flipH="1">
-            <a:off x="1735136" y="2750347"/>
+            <a:off x="1751798" y="4055272"/>
             <a:ext cx="1343025" cy="671512"/>
           </a:xfrm>
           <a:prstGeom prst="ellipse">
@@ -3797,6 +3804,48 @@
           </a:p>
         </p:txBody>
       </p:sp>
+      <p:cxnSp>
+        <p:nvCxnSpPr>
+          <p:cNvPr id="3" name="Straight Arrow Connector 2">
+            <a:extLst>
+              <a:ext uri="{FF2B5EF4-FFF2-40B4-BE49-F238E27FC236}">
+                <a16:creationId xmlns:a16="http://schemas.microsoft.com/office/drawing/2014/main" id="{DDEE38F1-A03E-406A-841F-DE218301AA0E}"/>
+              </a:ext>
+            </a:extLst>
+          </p:cNvPr>
+          <p:cNvCxnSpPr>
+            <a:stCxn id="9" idx="3"/>
+            <a:endCxn id="10" idx="0"/>
+          </p:cNvCxnSpPr>
+          <p:nvPr/>
+        </p:nvCxnSpPr>
+        <p:spPr>
+          <a:xfrm>
+            <a:off x="1903415" y="789384"/>
+            <a:ext cx="2394743" cy="676270"/>
+          </a:xfrm>
+          <a:prstGeom prst="curvedConnector2">
+            <a:avLst/>
+          </a:prstGeom>
+          <a:ln w="19050">
+            <a:tailEnd type="triangle"/>
+          </a:ln>
+        </p:spPr>
+        <p:style>
+          <a:lnRef idx="1">
+            <a:schemeClr val="accent1"/>
+          </a:lnRef>
+          <a:fillRef idx="0">
+            <a:schemeClr val="accent1"/>
+          </a:fillRef>
+          <a:effectRef idx="0">
+            <a:schemeClr val="accent1"/>
+          </a:effectRef>
+          <a:fontRef idx="minor">
+            <a:schemeClr val="tx1"/>
+          </a:fontRef>
+        </p:style>
+      </p:cxnSp>
     </p:spTree>
     <p:extLst>
       <p:ext uri="{BB962C8B-B14F-4D97-AF65-F5344CB8AC3E}">

</xml_diff>